<commit_message>
Slides updated with examples and internet link
</commit_message>
<xml_diff>
--- a/shellscripting.pptx
+++ b/shellscripting.pptx
@@ -201,7 +201,7 @@
           <a:p>
             <a:fld id="{AE72FB97-F104-6B43-98BA-8F88D58C7424}" type="datetimeFigureOut">
               <a:rPr lang="en-US" smtClean="0"/>
-              <a:t>14/09/15</a:t>
+              <a:t>15/09/15</a:t>
             </a:fld>
             <a:endParaRPr lang="en-US"/>
           </a:p>
@@ -597,6 +597,50 @@
           <a:bodyPr/>
           <a:lstStyle/>
           <a:p>
+            <a:r>
+              <a:rPr lang="en-US" dirty="0" smtClean="0"/>
+              <a:t>Show example: open</a:t>
+            </a:r>
+            <a:r>
+              <a:rPr lang="en-US" baseline="0" dirty="0" smtClean="0"/>
+              <a:t> terminal, use </a:t>
+            </a:r>
+            <a:r>
+              <a:rPr lang="en-US" baseline="0" dirty="0" err="1" smtClean="0"/>
+              <a:t>ls</a:t>
+            </a:r>
+            <a:r>
+              <a:rPr lang="en-US" baseline="0" dirty="0" smtClean="0"/>
+              <a:t> and </a:t>
+            </a:r>
+            <a:r>
+              <a:rPr lang="en-US" baseline="0" dirty="0" err="1" smtClean="0"/>
+              <a:t>pwd</a:t>
+            </a:r>
+            <a:r>
+              <a:rPr lang="en-US" baseline="0" dirty="0" smtClean="0"/>
+              <a:t>. </a:t>
+            </a:r>
+          </a:p>
+          <a:p>
+            <a:r>
+              <a:rPr lang="en-US" baseline="0" dirty="0" smtClean="0"/>
+              <a:t>The stuff you write in the terminal is evaluated when you press enter. </a:t>
+            </a:r>
+          </a:p>
+          <a:p>
+            <a:r>
+              <a:rPr lang="en-US" baseline="0" dirty="0" smtClean="0"/>
+              <a:t>When you open the terminal you’ll start off in your home directory (at least in </a:t>
+            </a:r>
+            <a:r>
+              <a:rPr lang="en-US" baseline="0" dirty="0" err="1" smtClean="0"/>
+              <a:t>osx</a:t>
+            </a:r>
+            <a:r>
+              <a:rPr lang="en-US" baseline="0" dirty="0" smtClean="0"/>
+              <a:t>/nix)</a:t>
+            </a:r>
             <a:endParaRPr lang="en-US" dirty="0"/>
           </a:p>
         </p:txBody>
@@ -682,73 +726,26 @@
           <a:lstStyle/>
           <a:p>
             <a:r>
-              <a:rPr lang="en-US" dirty="0" smtClean="0"/>
-              <a:t>Show</a:t>
-            </a:r>
-            <a:r>
-              <a:rPr lang="en-US" baseline="0" dirty="0" smtClean="0"/>
-              <a:t> in terminal:</a:t>
-            </a:r>
-            <a:endParaRPr lang="en-US" dirty="0" smtClean="0"/>
-          </a:p>
-          <a:p>
-            <a:r>
               <a:rPr lang="en-US" dirty="0" err="1" smtClean="0"/>
               <a:t>ls</a:t>
             </a:r>
-            <a:endParaRPr lang="en-US" dirty="0" smtClean="0"/>
-          </a:p>
-          <a:p>
+            <a:r>
+              <a:rPr lang="en-US" dirty="0" smtClean="0"/>
+              <a:t>, </a:t>
+            </a:r>
             <a:r>
               <a:rPr lang="en-US" dirty="0" err="1" smtClean="0"/>
-              <a:t>mkdir</a:t>
-            </a:r>
-            <a:r>
-              <a:rPr lang="en-US" dirty="0" smtClean="0"/>
-              <a:t> </a:t>
-            </a:r>
-            <a:r>
-              <a:rPr lang="en-US" dirty="0" err="1" smtClean="0"/>
-              <a:t>myFineDirectory</a:t>
-            </a:r>
-            <a:endParaRPr lang="en-US" dirty="0" smtClean="0"/>
-          </a:p>
-          <a:p>
-            <a:r>
-              <a:rPr lang="en-US" dirty="0" err="1" smtClean="0"/>
-              <a:t>ls</a:t>
+              <a:t>pwd</a:t>
+            </a:r>
+            <a:r>
+              <a:rPr lang="en-US" dirty="0" smtClean="0"/>
+              <a:t> that we just used are such programs.</a:t>
             </a:r>
             <a:r>
               <a:rPr lang="en-US" baseline="0" dirty="0" smtClean="0"/>
-              <a:t> -l</a:t>
-            </a:r>
-            <a:endParaRPr lang="en-US" dirty="0" smtClean="0"/>
-          </a:p>
-          <a:p>
-            <a:r>
-              <a:rPr lang="en-US" dirty="0" err="1" smtClean="0"/>
-              <a:t>rm</a:t>
-            </a:r>
-            <a:r>
-              <a:rPr lang="en-US" dirty="0" smtClean="0"/>
-              <a:t> –</a:t>
-            </a:r>
-            <a:r>
-              <a:rPr lang="en-US" dirty="0" err="1" smtClean="0"/>
-              <a:t>rf</a:t>
-            </a:r>
-            <a:r>
-              <a:rPr lang="en-US" dirty="0" smtClean="0"/>
-              <a:t> </a:t>
-            </a:r>
-            <a:r>
-              <a:rPr lang="en-US" dirty="0" err="1" smtClean="0"/>
-              <a:t>myFineDirectory</a:t>
-            </a:r>
-            <a:endParaRPr lang="en-US" dirty="0" smtClean="0"/>
-          </a:p>
-          <a:p>
-            <a:endParaRPr lang="en-US" dirty="0" smtClean="0"/>
+              <a:t> There are MANY of them. </a:t>
+            </a:r>
+            <a:endParaRPr lang="en-US" dirty="0"/>
           </a:p>
         </p:txBody>
       </p:sp>
@@ -769,7 +766,7 @@
           <a:p>
             <a:fld id="{54916FC5-E689-9048-ACDD-CC1C4C78EE36}" type="slidenum">
               <a:rPr lang="en-US" smtClean="0"/>
-              <a:t>5</a:t>
+              <a:t>4</a:t>
             </a:fld>
             <a:endParaRPr lang="en-US"/>
           </a:p>
@@ -778,7 +775,7 @@
     </p:spTree>
     <p:extLst>
       <p:ext uri="{BB962C8B-B14F-4D97-AF65-F5344CB8AC3E}">
-        <p14:creationId xmlns:p14="http://schemas.microsoft.com/office/powerpoint/2010/main" val="3835467696"/>
+        <p14:creationId xmlns:p14="http://schemas.microsoft.com/office/powerpoint/2010/main" val="3549993773"/>
       </p:ext>
     </p:extLst>
   </p:cSld>
@@ -834,15 +831,114 @@
           <a:p>
             <a:r>
               <a:rPr lang="en-US" dirty="0" smtClean="0"/>
-              <a:t>Use Google</a:t>
-            </a:r>
-          </a:p>
-          <a:p>
-            <a:r>
-              <a:rPr lang="en-US" dirty="0" smtClean="0"/>
-              <a:t>Use man-pages</a:t>
-            </a:r>
-            <a:endParaRPr lang="en-US" dirty="0"/>
+              <a:t>Show</a:t>
+            </a:r>
+            <a:r>
+              <a:rPr lang="en-US" baseline="0" dirty="0" smtClean="0"/>
+              <a:t> in terminal:</a:t>
+            </a:r>
+            <a:endParaRPr lang="en-US" dirty="0" smtClean="0"/>
+          </a:p>
+          <a:p>
+            <a:r>
+              <a:rPr lang="en-US" dirty="0" err="1" smtClean="0"/>
+              <a:t>ls</a:t>
+            </a:r>
+            <a:endParaRPr lang="en-US" dirty="0" smtClean="0"/>
+          </a:p>
+          <a:p>
+            <a:r>
+              <a:rPr lang="en-US" dirty="0" err="1" smtClean="0"/>
+              <a:t>mkdir</a:t>
+            </a:r>
+            <a:r>
+              <a:rPr lang="en-US" dirty="0" smtClean="0"/>
+              <a:t> </a:t>
+            </a:r>
+            <a:r>
+              <a:rPr lang="en-US" dirty="0" err="1" smtClean="0"/>
+              <a:t>myFineDirectory</a:t>
+            </a:r>
+            <a:endParaRPr lang="en-US" dirty="0" smtClean="0"/>
+          </a:p>
+          <a:p>
+            <a:r>
+              <a:rPr lang="en-US" dirty="0" err="1" smtClean="0"/>
+              <a:t>ls</a:t>
+            </a:r>
+            <a:r>
+              <a:rPr lang="en-US" baseline="0" dirty="0" smtClean="0"/>
+              <a:t> -l</a:t>
+            </a:r>
+            <a:endParaRPr lang="en-US" dirty="0" smtClean="0"/>
+          </a:p>
+          <a:p>
+            <a:r>
+              <a:rPr lang="en-US" dirty="0" err="1" smtClean="0"/>
+              <a:t>rm</a:t>
+            </a:r>
+            <a:r>
+              <a:rPr lang="en-US" dirty="0" smtClean="0"/>
+              <a:t> –</a:t>
+            </a:r>
+            <a:r>
+              <a:rPr lang="en-US" dirty="0" err="1" smtClean="0"/>
+              <a:t>rf</a:t>
+            </a:r>
+            <a:r>
+              <a:rPr lang="en-US" dirty="0" smtClean="0"/>
+              <a:t> </a:t>
+            </a:r>
+            <a:r>
+              <a:rPr lang="en-US" dirty="0" err="1" smtClean="0"/>
+              <a:t>myFineDirectory</a:t>
+            </a:r>
+            <a:endParaRPr lang="en-US" dirty="0" smtClean="0"/>
+          </a:p>
+          <a:p>
+            <a:endParaRPr lang="en-US" dirty="0" smtClean="0"/>
+          </a:p>
+          <a:p>
+            <a:r>
+              <a:rPr lang="en-US" dirty="0" smtClean="0"/>
+              <a:t>There are two main ways of giving parameters. The </a:t>
+            </a:r>
+            <a:r>
+              <a:rPr lang="en-US" dirty="0" err="1" smtClean="0"/>
+              <a:t>unix</a:t>
+            </a:r>
+            <a:r>
+              <a:rPr lang="en-US" dirty="0" smtClean="0"/>
+              <a:t> ways:</a:t>
+            </a:r>
+            <a:r>
+              <a:rPr lang="en-US" baseline="0" dirty="0" smtClean="0"/>
+              <a:t> </a:t>
+            </a:r>
+          </a:p>
+          <a:p>
+            <a:r>
+              <a:rPr lang="en-US" baseline="0" dirty="0" smtClean="0"/>
+              <a:t>-p shorthand, </a:t>
+            </a:r>
+            <a:r>
+              <a:rPr lang="en-US" baseline="0" dirty="0" err="1" smtClean="0"/>
+              <a:t>onecharacter</a:t>
+            </a:r>
+            <a:r>
+              <a:rPr lang="en-US" baseline="0" dirty="0" smtClean="0"/>
+              <a:t> parameters. Often you can use several characters after the –</a:t>
+            </a:r>
+          </a:p>
+          <a:p>
+            <a:r>
+              <a:rPr lang="en-US" baseline="0" dirty="0" smtClean="0"/>
+              <a:t>--print typed-out, whole-word parameters. </a:t>
+            </a:r>
+            <a:endParaRPr lang="en-US" dirty="0" smtClean="0"/>
+          </a:p>
+          <a:p>
+            <a:endParaRPr lang="en-US" dirty="0" smtClean="0"/>
           </a:p>
         </p:txBody>
       </p:sp>
@@ -863,7 +959,7 @@
           <a:p>
             <a:fld id="{54916FC5-E689-9048-ACDD-CC1C4C78EE36}" type="slidenum">
               <a:rPr lang="en-US" smtClean="0"/>
-              <a:t>6</a:t>
+              <a:t>5</a:t>
             </a:fld>
             <a:endParaRPr lang="en-US"/>
           </a:p>
@@ -872,7 +968,7 @@
     </p:spTree>
     <p:extLst>
       <p:ext uri="{BB962C8B-B14F-4D97-AF65-F5344CB8AC3E}">
-        <p14:creationId xmlns:p14="http://schemas.microsoft.com/office/powerpoint/2010/main" val="2669565549"/>
+        <p14:creationId xmlns:p14="http://schemas.microsoft.com/office/powerpoint/2010/main" val="3835467696"/>
       </p:ext>
     </p:extLst>
   </p:cSld>
@@ -928,6 +1024,213 @@
           <a:p>
             <a:r>
               <a:rPr lang="en-US" dirty="0" smtClean="0"/>
+              <a:t>Many commands use the same characters</a:t>
+            </a:r>
+            <a:r>
+              <a:rPr lang="en-US" baseline="0" dirty="0" smtClean="0"/>
+              <a:t> for certain parameters. Always check! </a:t>
+            </a:r>
+            <a:endParaRPr lang="en-US" dirty="0" smtClean="0"/>
+          </a:p>
+          <a:p>
+            <a:r>
+              <a:rPr lang="en-US" dirty="0" smtClean="0"/>
+              <a:t>Use </a:t>
+            </a:r>
+            <a:r>
+              <a:rPr lang="en-US" dirty="0" smtClean="0"/>
+              <a:t>Google</a:t>
+            </a:r>
+          </a:p>
+          <a:p>
+            <a:r>
+              <a:rPr lang="en-US" dirty="0" smtClean="0"/>
+              <a:t>Use man-pages</a:t>
+            </a:r>
+            <a:endParaRPr lang="en-US" dirty="0"/>
+          </a:p>
+        </p:txBody>
+      </p:sp>
+      <p:sp>
+        <p:nvSpPr>
+          <p:cNvPr id="4" name="Slide Number Placeholder 3"/>
+          <p:cNvSpPr>
+            <a:spLocks noGrp="1"/>
+          </p:cNvSpPr>
+          <p:nvPr>
+            <p:ph type="sldNum" sz="quarter" idx="10"/>
+          </p:nvPr>
+        </p:nvSpPr>
+        <p:spPr/>
+        <p:txBody>
+          <a:bodyPr/>
+          <a:lstStyle/>
+          <a:p>
+            <a:fld id="{54916FC5-E689-9048-ACDD-CC1C4C78EE36}" type="slidenum">
+              <a:rPr lang="en-US" smtClean="0"/>
+              <a:t>6</a:t>
+            </a:fld>
+            <a:endParaRPr lang="en-US"/>
+          </a:p>
+        </p:txBody>
+      </p:sp>
+    </p:spTree>
+    <p:extLst>
+      <p:ext uri="{BB962C8B-B14F-4D97-AF65-F5344CB8AC3E}">
+        <p14:creationId xmlns:p14="http://schemas.microsoft.com/office/powerpoint/2010/main" val="2669565549"/>
+      </p:ext>
+    </p:extLst>
+  </p:cSld>
+  <p:clrMapOvr>
+    <a:masterClrMapping/>
+  </p:clrMapOvr>
+</p:notes>
+</file>
+
+<file path=ppt/notesSlides/notesSlide6.xml><?xml version="1.0" encoding="utf-8"?>
+<p:notes xmlns:a="http://schemas.openxmlformats.org/drawingml/2006/main" xmlns:r="http://schemas.openxmlformats.org/officeDocument/2006/relationships" xmlns:p="http://schemas.openxmlformats.org/presentationml/2006/main">
+  <p:cSld>
+    <p:spTree>
+      <p:nvGrpSpPr>
+        <p:cNvPr id="1" name=""/>
+        <p:cNvGrpSpPr/>
+        <p:nvPr/>
+      </p:nvGrpSpPr>
+      <p:grpSpPr>
+        <a:xfrm>
+          <a:off x="0" y="0"/>
+          <a:ext cx="0" cy="0"/>
+          <a:chOff x="0" y="0"/>
+          <a:chExt cx="0" cy="0"/>
+        </a:xfrm>
+      </p:grpSpPr>
+      <p:sp>
+        <p:nvSpPr>
+          <p:cNvPr id="2" name="Slide Image Placeholder 1"/>
+          <p:cNvSpPr>
+            <a:spLocks noGrp="1" noRot="1" noChangeAspect="1"/>
+          </p:cNvSpPr>
+          <p:nvPr>
+            <p:ph type="sldImg"/>
+          </p:nvPr>
+        </p:nvSpPr>
+        <p:spPr/>
+      </p:sp>
+      <p:sp>
+        <p:nvSpPr>
+          <p:cNvPr id="3" name="Notes Placeholder 2"/>
+          <p:cNvSpPr>
+            <a:spLocks noGrp="1"/>
+          </p:cNvSpPr>
+          <p:nvPr>
+            <p:ph type="body" idx="1"/>
+          </p:nvPr>
+        </p:nvSpPr>
+        <p:spPr/>
+        <p:txBody>
+          <a:bodyPr/>
+          <a:lstStyle/>
+          <a:p>
+            <a:r>
+              <a:rPr lang="en-US" dirty="0" smtClean="0"/>
+              <a:t>Each</a:t>
+            </a:r>
+            <a:r>
+              <a:rPr lang="en-US" baseline="0" dirty="0" smtClean="0"/>
+              <a:t> command is really small and can do only small things. You can string together commands with pipe. </a:t>
+            </a:r>
+          </a:p>
+          <a:p>
+            <a:r>
+              <a:rPr lang="en-US" baseline="0" dirty="0" smtClean="0"/>
+              <a:t>Sends output from standard out to standard in. You can also use &lt; and &gt; to direct input and output. </a:t>
+            </a:r>
+            <a:endParaRPr lang="en-US" dirty="0"/>
+          </a:p>
+        </p:txBody>
+      </p:sp>
+      <p:sp>
+        <p:nvSpPr>
+          <p:cNvPr id="4" name="Slide Number Placeholder 3"/>
+          <p:cNvSpPr>
+            <a:spLocks noGrp="1"/>
+          </p:cNvSpPr>
+          <p:nvPr>
+            <p:ph type="sldNum" sz="quarter" idx="10"/>
+          </p:nvPr>
+        </p:nvSpPr>
+        <p:spPr/>
+        <p:txBody>
+          <a:bodyPr/>
+          <a:lstStyle/>
+          <a:p>
+            <a:fld id="{54916FC5-E689-9048-ACDD-CC1C4C78EE36}" type="slidenum">
+              <a:rPr lang="en-US" smtClean="0"/>
+              <a:t>7</a:t>
+            </a:fld>
+            <a:endParaRPr lang="en-US"/>
+          </a:p>
+        </p:txBody>
+      </p:sp>
+    </p:spTree>
+    <p:extLst>
+      <p:ext uri="{BB962C8B-B14F-4D97-AF65-F5344CB8AC3E}">
+        <p14:creationId xmlns:p14="http://schemas.microsoft.com/office/powerpoint/2010/main" val="2841861854"/>
+      </p:ext>
+    </p:extLst>
+  </p:cSld>
+  <p:clrMapOvr>
+    <a:masterClrMapping/>
+  </p:clrMapOvr>
+</p:notes>
+</file>
+
+<file path=ppt/notesSlides/notesSlide7.xml><?xml version="1.0" encoding="utf-8"?>
+<p:notes xmlns:a="http://schemas.openxmlformats.org/drawingml/2006/main" xmlns:r="http://schemas.openxmlformats.org/officeDocument/2006/relationships" xmlns:p="http://schemas.openxmlformats.org/presentationml/2006/main">
+  <p:cSld>
+    <p:spTree>
+      <p:nvGrpSpPr>
+        <p:cNvPr id="1" name=""/>
+        <p:cNvGrpSpPr/>
+        <p:nvPr/>
+      </p:nvGrpSpPr>
+      <p:grpSpPr>
+        <a:xfrm>
+          <a:off x="0" y="0"/>
+          <a:ext cx="0" cy="0"/>
+          <a:chOff x="0" y="0"/>
+          <a:chExt cx="0" cy="0"/>
+        </a:xfrm>
+      </p:grpSpPr>
+      <p:sp>
+        <p:nvSpPr>
+          <p:cNvPr id="2" name="Slide Image Placeholder 1"/>
+          <p:cNvSpPr>
+            <a:spLocks noGrp="1" noRot="1" noChangeAspect="1"/>
+          </p:cNvSpPr>
+          <p:nvPr>
+            <p:ph type="sldImg"/>
+          </p:nvPr>
+        </p:nvSpPr>
+        <p:spPr/>
+      </p:sp>
+      <p:sp>
+        <p:nvSpPr>
+          <p:cNvPr id="3" name="Notes Placeholder 2"/>
+          <p:cNvSpPr>
+            <a:spLocks noGrp="1"/>
+          </p:cNvSpPr>
+          <p:nvPr>
+            <p:ph type="body" idx="1"/>
+          </p:nvPr>
+        </p:nvSpPr>
+        <p:spPr/>
+        <p:txBody>
+          <a:bodyPr/>
+          <a:lstStyle/>
+          <a:p>
+            <a:r>
+              <a:rPr lang="en-US" dirty="0" smtClean="0"/>
               <a:t>cat </a:t>
             </a:r>
             <a:r>
@@ -936,27 +1239,22 @@
             </a:r>
             <a:r>
               <a:rPr lang="en-US" dirty="0" smtClean="0"/>
-              <a:t>/</a:t>
+              <a:t>/M-R.booster2014/example1/</a:t>
             </a:r>
             <a:r>
               <a:rPr lang="en-US" dirty="0" err="1" smtClean="0"/>
-              <a:t>nasjonalbiblioteket-stottesystem</a:t>
-            </a:r>
-            <a:r>
-              <a:rPr lang="en-US" dirty="0" smtClean="0"/>
-              <a:t>/</a:t>
+              <a:t>run.sh</a:t>
+            </a:r>
+            <a:endParaRPr lang="en-US" dirty="0" smtClean="0"/>
+          </a:p>
+          <a:p>
+            <a:r>
+              <a:rPr lang="en-US" dirty="0" smtClean="0"/>
+              <a:t>cat coding/</a:t>
             </a:r>
             <a:r>
               <a:rPr lang="en-US" dirty="0" err="1" smtClean="0"/>
-              <a:t>mksystem</a:t>
-            </a:r>
-            <a:r>
-              <a:rPr lang="en-US" dirty="0" smtClean="0"/>
-              <a:t>/jetty-</a:t>
-            </a:r>
-            <a:r>
-              <a:rPr lang="en-US" dirty="0" err="1" smtClean="0"/>
-              <a:t>local.sh</a:t>
+              <a:t>extractTestNames.sh</a:t>
             </a:r>
             <a:endParaRPr lang="en-US" dirty="0" smtClean="0"/>
           </a:p>
@@ -971,57 +1269,27 @@
             </a:r>
             <a:r>
               <a:rPr lang="en-US" dirty="0" smtClean="0"/>
-              <a:t>/M-R.booster2014/example1/</a:t>
+              <a:t>/</a:t>
             </a:r>
             <a:r>
               <a:rPr lang="en-US" dirty="0" err="1" smtClean="0"/>
-              <a:t>run.sh</a:t>
-            </a:r>
-            <a:endParaRPr lang="en-US" dirty="0" smtClean="0"/>
-          </a:p>
-          <a:p>
-            <a:r>
-              <a:rPr lang="en-US" dirty="0" smtClean="0"/>
-              <a:t>cat coding/</a:t>
+              <a:t>svarut</a:t>
+            </a:r>
+            <a:r>
+              <a:rPr lang="en-US" dirty="0" smtClean="0"/>
+              <a:t>-develop/</a:t>
             </a:r>
             <a:r>
               <a:rPr lang="en-US" dirty="0" err="1" smtClean="0"/>
-              <a:t>extractTestNames.sh</a:t>
-            </a:r>
-            <a:endParaRPr lang="en-US" dirty="0" smtClean="0"/>
-          </a:p>
-          <a:p>
-            <a:r>
-              <a:rPr lang="en-US" dirty="0" smtClean="0"/>
-              <a:t>cat </a:t>
+              <a:t>svarut</a:t>
+            </a:r>
+            <a:r>
+              <a:rPr lang="en-US" dirty="0" smtClean="0"/>
+              <a:t>/</a:t>
             </a:r>
             <a:r>
               <a:rPr lang="en-US" dirty="0" err="1" smtClean="0"/>
-              <a:t>git</a:t>
-            </a:r>
-            <a:r>
-              <a:rPr lang="en-US" dirty="0" smtClean="0"/>
-              <a:t>/</a:t>
-            </a:r>
-            <a:r>
-              <a:rPr lang="en-US" dirty="0" err="1" smtClean="0"/>
-              <a:t>nasjonalbiblioteket-stottesystem</a:t>
-            </a:r>
-            <a:r>
-              <a:rPr lang="en-US" dirty="0" smtClean="0"/>
-              <a:t>/</a:t>
-            </a:r>
-            <a:r>
-              <a:rPr lang="en-US" dirty="0" err="1" smtClean="0"/>
-              <a:t>mksystem</a:t>
-            </a:r>
-            <a:r>
-              <a:rPr lang="en-US" dirty="0" smtClean="0"/>
-              <a:t>/</a:t>
-            </a:r>
-            <a:r>
-              <a:rPr lang="en-US" dirty="0" err="1" smtClean="0"/>
-              <a:t>deployTomcat.sh</a:t>
+              <a:t>deployvagrant.sh</a:t>
             </a:r>
             <a:endParaRPr lang="en-US" dirty="0"/>
           </a:p>
@@ -1244,7 +1512,7 @@
           <a:p>
             <a:fld id="{0C306B1D-BC7F-6B48-AEFB-505DBC9F9C01}" type="datetimeFigureOut">
               <a:rPr lang="en-US" smtClean="0"/>
-              <a:t>14/09/15</a:t>
+              <a:t>15/09/15</a:t>
             </a:fld>
             <a:endParaRPr lang="en-US"/>
           </a:p>
@@ -1414,7 +1682,7 @@
           <a:p>
             <a:fld id="{0C306B1D-BC7F-6B48-AEFB-505DBC9F9C01}" type="datetimeFigureOut">
               <a:rPr lang="en-US" smtClean="0"/>
-              <a:t>14/09/15</a:t>
+              <a:t>15/09/15</a:t>
             </a:fld>
             <a:endParaRPr lang="en-US"/>
           </a:p>
@@ -1594,7 +1862,7 @@
           <a:p>
             <a:fld id="{0C306B1D-BC7F-6B48-AEFB-505DBC9F9C01}" type="datetimeFigureOut">
               <a:rPr lang="en-US" smtClean="0"/>
-              <a:t>14/09/15</a:t>
+              <a:t>15/09/15</a:t>
             </a:fld>
             <a:endParaRPr lang="en-US"/>
           </a:p>
@@ -1764,7 +2032,7 @@
           <a:p>
             <a:fld id="{0C306B1D-BC7F-6B48-AEFB-505DBC9F9C01}" type="datetimeFigureOut">
               <a:rPr lang="en-US" smtClean="0"/>
-              <a:t>14/09/15</a:t>
+              <a:t>15/09/15</a:t>
             </a:fld>
             <a:endParaRPr lang="en-US"/>
           </a:p>
@@ -2010,7 +2278,7 @@
           <a:p>
             <a:fld id="{0C306B1D-BC7F-6B48-AEFB-505DBC9F9C01}" type="datetimeFigureOut">
               <a:rPr lang="en-US" smtClean="0"/>
-              <a:t>14/09/15</a:t>
+              <a:t>15/09/15</a:t>
             </a:fld>
             <a:endParaRPr lang="en-US"/>
           </a:p>
@@ -2298,7 +2566,7 @@
           <a:p>
             <a:fld id="{0C306B1D-BC7F-6B48-AEFB-505DBC9F9C01}" type="datetimeFigureOut">
               <a:rPr lang="en-US" smtClean="0"/>
-              <a:t>14/09/15</a:t>
+              <a:t>15/09/15</a:t>
             </a:fld>
             <a:endParaRPr lang="en-US"/>
           </a:p>
@@ -2720,7 +2988,7 @@
           <a:p>
             <a:fld id="{0C306B1D-BC7F-6B48-AEFB-505DBC9F9C01}" type="datetimeFigureOut">
               <a:rPr lang="en-US" smtClean="0"/>
-              <a:t>14/09/15</a:t>
+              <a:t>15/09/15</a:t>
             </a:fld>
             <a:endParaRPr lang="en-US"/>
           </a:p>
@@ -2838,7 +3106,7 @@
           <a:p>
             <a:fld id="{0C306B1D-BC7F-6B48-AEFB-505DBC9F9C01}" type="datetimeFigureOut">
               <a:rPr lang="en-US" smtClean="0"/>
-              <a:t>14/09/15</a:t>
+              <a:t>15/09/15</a:t>
             </a:fld>
             <a:endParaRPr lang="en-US"/>
           </a:p>
@@ -2933,7 +3201,7 @@
           <a:p>
             <a:fld id="{0C306B1D-BC7F-6B48-AEFB-505DBC9F9C01}" type="datetimeFigureOut">
               <a:rPr lang="en-US" smtClean="0"/>
-              <a:t>14/09/15</a:t>
+              <a:t>15/09/15</a:t>
             </a:fld>
             <a:endParaRPr lang="en-US"/>
           </a:p>
@@ -3210,7 +3478,7 @@
           <a:p>
             <a:fld id="{0C306B1D-BC7F-6B48-AEFB-505DBC9F9C01}" type="datetimeFigureOut">
               <a:rPr lang="en-US" smtClean="0"/>
-              <a:t>14/09/15</a:t>
+              <a:t>15/09/15</a:t>
             </a:fld>
             <a:endParaRPr lang="en-US"/>
           </a:p>
@@ -3463,7 +3731,7 @@
           <a:p>
             <a:fld id="{0C306B1D-BC7F-6B48-AEFB-505DBC9F9C01}" type="datetimeFigureOut">
               <a:rPr lang="en-US" smtClean="0"/>
-              <a:t>14/09/15</a:t>
+              <a:t>15/09/15</a:t>
             </a:fld>
             <a:endParaRPr lang="en-US"/>
           </a:p>
@@ -3676,7 +3944,7 @@
           <a:p>
             <a:fld id="{0C306B1D-BC7F-6B48-AEFB-505DBC9F9C01}" type="datetimeFigureOut">
               <a:rPr lang="en-US" smtClean="0"/>
-              <a:t>14/09/15</a:t>
+              <a:t>15/09/15</a:t>
             </a:fld>
             <a:endParaRPr lang="en-US"/>
           </a:p>
@@ -4144,7 +4412,7 @@
           <a:p>
             <a:r>
               <a:rPr lang="en-US" dirty="0" smtClean="0"/>
-              <a:t>Exercises</a:t>
+              <a:t>Assignment for the day</a:t>
             </a:r>
             <a:endParaRPr lang="en-US" dirty="0"/>
           </a:p>
@@ -4188,11 +4456,25 @@
           <a:p>
             <a:r>
               <a:rPr lang="en-US" dirty="0" smtClean="0"/>
-              <a:t>Slides, exercises </a:t>
-            </a:r>
-            <a:r>
-              <a:rPr lang="en-US" smtClean="0"/>
-              <a:t>and tips</a:t>
+              <a:t>Slides, exercises and </a:t>
+            </a:r>
+            <a:r>
+              <a:rPr lang="en-US" dirty="0" smtClean="0"/>
+              <a:t>tips</a:t>
+            </a:r>
+          </a:p>
+          <a:p>
+            <a:r>
+              <a:rPr lang="en-US" dirty="0"/>
+              <a:t>Need internet? http://</a:t>
+            </a:r>
+            <a:r>
+              <a:rPr lang="en-US" dirty="0" err="1"/>
+              <a:t>bit.ly</a:t>
+            </a:r>
+            <a:r>
+              <a:rPr lang="en-US" dirty="0"/>
+              <a:t>/1KQzKSO</a:t>
             </a:r>
             <a:endParaRPr lang="en-US" dirty="0" smtClean="0"/>
           </a:p>
@@ -4658,7 +4940,17 @@
           <a:p>
             <a:r>
               <a:rPr lang="en-US" dirty="0" smtClean="0"/>
-              <a:t>-f file or force</a:t>
+              <a:t>-f file or </a:t>
+            </a:r>
+            <a:r>
+              <a:rPr lang="en-US" dirty="0" smtClean="0"/>
+              <a:t>force</a:t>
+            </a:r>
+          </a:p>
+          <a:p>
+            <a:r>
+              <a:rPr lang="en-US" dirty="0" smtClean="0"/>
+              <a:t>-h help</a:t>
             </a:r>
             <a:endParaRPr lang="en-US" dirty="0"/>
           </a:p>

</xml_diff>